<commit_message>
finishing touches on the presentation
</commit_message>
<xml_diff>
--- a/Documents/Digitronix Presentation.pptx
+++ b/Documents/Digitronix Presentation.pptx
@@ -29,11 +29,11 @@
   <p:notesSz cx="6858000" cy="9144000"/>
   <p:embeddedFontLst>
     <p:embeddedFont>
-      <p:font typeface="Garet" panose="020B0604020202020204" charset="-52"/>
+      <p:font typeface="Garet" panose="020B0604020202020204" charset="0"/>
       <p:regular r:id="rId19"/>
     </p:embeddedFont>
     <p:embeddedFont>
-      <p:font typeface="Garet Bold" panose="020B0604020202020204" charset="-52"/>
+      <p:font typeface="Garet Bold" panose="020B0604020202020204" charset="0"/>
       <p:regular r:id="rId20"/>
     </p:embeddedFont>
     <p:embeddedFont>
@@ -237,7 +237,7 @@
           <a:p>
             <a:fld id="{B84F6D03-FE45-4F75-86C5-B0721DF4B29F}" type="datetimeFigureOut">
               <a:rPr lang="en-US" smtClean="0"/>
-              <a:t>12/7/2025</a:t>
+              <a:t>12/8/2025</a:t>
             </a:fld>
             <a:endParaRPr lang="en-US"/>
           </a:p>
@@ -768,7 +768,7 @@
             <a:fld id="{1D8BD707-D9CF-40AE-B4C6-C98DA3205C09}" type="datetimeFigureOut">
               <a:rPr lang="en-US" smtClean="0"/>
               <a:pPr/>
-              <a:t>12/7/2025</a:t>
+              <a:t>12/8/2025</a:t>
             </a:fld>
             <a:endParaRPr lang="en-US"/>
           </a:p>
@@ -945,7 +945,7 @@
             <a:fld id="{1D8BD707-D9CF-40AE-B4C6-C98DA3205C09}" type="datetimeFigureOut">
               <a:rPr lang="en-US" smtClean="0"/>
               <a:pPr/>
-              <a:t>12/7/2025</a:t>
+              <a:t>12/8/2025</a:t>
             </a:fld>
             <a:endParaRPr lang="en-US"/>
           </a:p>
@@ -1132,7 +1132,7 @@
             <a:fld id="{1D8BD707-D9CF-40AE-B4C6-C98DA3205C09}" type="datetimeFigureOut">
               <a:rPr lang="en-US" smtClean="0"/>
               <a:pPr/>
-              <a:t>12/7/2025</a:t>
+              <a:t>12/8/2025</a:t>
             </a:fld>
             <a:endParaRPr lang="en-US"/>
           </a:p>
@@ -1309,7 +1309,7 @@
             <a:fld id="{1D8BD707-D9CF-40AE-B4C6-C98DA3205C09}" type="datetimeFigureOut">
               <a:rPr lang="en-US" smtClean="0"/>
               <a:pPr/>
-              <a:t>12/7/2025</a:t>
+              <a:t>12/8/2025</a:t>
             </a:fld>
             <a:endParaRPr lang="en-US"/>
           </a:p>
@@ -1563,7 +1563,7 @@
             <a:fld id="{1D8BD707-D9CF-40AE-B4C6-C98DA3205C09}" type="datetimeFigureOut">
               <a:rPr lang="en-US" smtClean="0"/>
               <a:pPr/>
-              <a:t>12/7/2025</a:t>
+              <a:t>12/8/2025</a:t>
             </a:fld>
             <a:endParaRPr lang="en-US"/>
           </a:p>
@@ -1857,7 +1857,7 @@
             <a:fld id="{1D8BD707-D9CF-40AE-B4C6-C98DA3205C09}" type="datetimeFigureOut">
               <a:rPr lang="en-US" smtClean="0"/>
               <a:pPr/>
-              <a:t>12/7/2025</a:t>
+              <a:t>12/8/2025</a:t>
             </a:fld>
             <a:endParaRPr lang="en-US"/>
           </a:p>
@@ -2285,7 +2285,7 @@
             <a:fld id="{1D8BD707-D9CF-40AE-B4C6-C98DA3205C09}" type="datetimeFigureOut">
               <a:rPr lang="en-US" smtClean="0"/>
               <a:pPr/>
-              <a:t>12/7/2025</a:t>
+              <a:t>12/8/2025</a:t>
             </a:fld>
             <a:endParaRPr lang="en-US"/>
           </a:p>
@@ -2411,7 +2411,7 @@
             <a:fld id="{1D8BD707-D9CF-40AE-B4C6-C98DA3205C09}" type="datetimeFigureOut">
               <a:rPr lang="en-US" smtClean="0"/>
               <a:pPr/>
-              <a:t>12/7/2025</a:t>
+              <a:t>12/8/2025</a:t>
             </a:fld>
             <a:endParaRPr lang="en-US"/>
           </a:p>
@@ -2515,7 +2515,7 @@
             <a:fld id="{1D8BD707-D9CF-40AE-B4C6-C98DA3205C09}" type="datetimeFigureOut">
               <a:rPr lang="en-US" smtClean="0"/>
               <a:pPr/>
-              <a:t>12/7/2025</a:t>
+              <a:t>12/8/2025</a:t>
             </a:fld>
             <a:endParaRPr lang="en-US"/>
           </a:p>
@@ -2799,7 +2799,7 @@
             <a:fld id="{1D8BD707-D9CF-40AE-B4C6-C98DA3205C09}" type="datetimeFigureOut">
               <a:rPr lang="en-US" smtClean="0"/>
               <a:pPr/>
-              <a:t>12/7/2025</a:t>
+              <a:t>12/8/2025</a:t>
             </a:fld>
             <a:endParaRPr lang="en-US"/>
           </a:p>
@@ -3060,7 +3060,7 @@
             <a:fld id="{1D8BD707-D9CF-40AE-B4C6-C98DA3205C09}" type="datetimeFigureOut">
               <a:rPr lang="en-US" smtClean="0"/>
               <a:pPr/>
-              <a:t>12/7/2025</a:t>
+              <a:t>12/8/2025</a:t>
             </a:fld>
             <a:endParaRPr lang="en-US"/>
           </a:p>
@@ -3280,7 +3280,7 @@
             <a:fld id="{1D8BD707-D9CF-40AE-B4C6-C98DA3205C09}" type="datetimeFigureOut">
               <a:rPr lang="en-US" smtClean="0"/>
               <a:pPr/>
-              <a:t>12/7/2025</a:t>
+              <a:t>12/8/2025</a:t>
             </a:fld>
             <a:endParaRPr lang="en-US"/>
           </a:p>
@@ -3831,6 +3831,13 @@
             </a:stretch>
           </a:blipFill>
         </p:spPr>
+        <p:txBody>
+          <a:bodyPr/>
+          <a:lstStyle/>
+          <a:p>
+            <a:endParaRPr lang="bg-BG"/>
+          </a:p>
+        </p:txBody>
       </p:sp>
     </p:spTree>
   </p:cSld>
@@ -3987,6 +3994,13 @@
             </a:stretch>
           </a:blipFill>
         </p:spPr>
+        <p:txBody>
+          <a:bodyPr/>
+          <a:lstStyle/>
+          <a:p>
+            <a:endParaRPr lang="bg-BG"/>
+          </a:p>
+        </p:txBody>
       </p:sp>
       <p:sp>
         <p:nvSpPr>
@@ -3996,7 +4010,7 @@
         </p:nvSpPr>
         <p:spPr>
           <a:xfrm>
-            <a:off x="4411027" y="814717"/>
+            <a:off x="4411027" y="934483"/>
             <a:ext cx="9465946" cy="2094804"/>
           </a:xfrm>
           <a:prstGeom prst="rect">
@@ -4037,8 +4051,8 @@
         </p:nvSpPr>
         <p:spPr>
           <a:xfrm>
-            <a:off x="4493270" y="4482087"/>
-            <a:ext cx="9301459" cy="4924425"/>
+            <a:off x="3656335" y="4469256"/>
+            <a:ext cx="10975330" cy="4924425"/>
           </a:xfrm>
           <a:prstGeom prst="rect">
             <a:avLst/>
@@ -4059,7 +4073,47 @@
                 <a:effectLst/>
                 <a:latin typeface="Garet" panose="020B0604020202020204" charset="-52"/>
               </a:rPr>
-              <a:t>We made a simple console-based implementation of the classic Minesweeper game built using C++. The game features random mine placement, cell reveal logic, flagging system, and automatic win/loss detection. This project demonstrates core C++ concepts such as arrays, loops, functions, and basic game logic.</a:t>
+              <a:t>We made a simple implementation of the classic Minesweeper game built using C++ and </a:t>
+            </a:r>
+            <a:r>
+              <a:rPr lang="en-US" sz="3200" b="0" i="0" dirty="0" err="1">
+                <a:solidFill>
+                  <a:srgbClr val="F0F6FC"/>
+                </a:solidFill>
+                <a:effectLst/>
+                <a:latin typeface="Garet" panose="020B0604020202020204" charset="-52"/>
+              </a:rPr>
+              <a:t>Raylib</a:t>
+            </a:r>
+            <a:r>
+              <a:rPr lang="en-US" sz="3200" b="0" i="0" dirty="0">
+                <a:solidFill>
+                  <a:srgbClr val="F0F6FC"/>
+                </a:solidFill>
+                <a:effectLst/>
+                <a:latin typeface="Garet" panose="020B0604020202020204" charset="-52"/>
+              </a:rPr>
+              <a:t>. The game features random mine placement, cell reveal logic, flagging system, and automatic win/loss detection. This project demonstrates core C++ concepts such as loops, functions, and basic game logic. We used </a:t>
+            </a:r>
+            <a:r>
+              <a:rPr lang="en-US" sz="3200" b="0" i="0" dirty="0" err="1">
+                <a:solidFill>
+                  <a:srgbClr val="F0F6FC"/>
+                </a:solidFill>
+                <a:effectLst/>
+                <a:latin typeface="Garet" panose="020B0604020202020204" charset="-52"/>
+              </a:rPr>
+              <a:t>Raylib</a:t>
+            </a:r>
+            <a:r>
+              <a:rPr lang="en-US" sz="3200" b="0" i="0" dirty="0">
+                <a:solidFill>
+                  <a:srgbClr val="F0F6FC"/>
+                </a:solidFill>
+                <a:effectLst/>
+                <a:latin typeface="Garet" panose="020B0604020202020204" charset="-52"/>
+              </a:rPr>
+              <a:t> for our drawing to look like the real game than a console-based program.</a:t>
             </a:r>
           </a:p>
           <a:p>
@@ -4309,6 +4363,13 @@
             </a:stretch>
           </a:blipFill>
         </p:spPr>
+        <p:txBody>
+          <a:bodyPr/>
+          <a:lstStyle/>
+          <a:p>
+            <a:endParaRPr lang="bg-BG"/>
+          </a:p>
+        </p:txBody>
       </p:sp>
       <p:sp>
         <p:nvSpPr>
@@ -4851,6 +4912,13 @@
             </a:stretch>
           </a:blipFill>
         </p:spPr>
+        <p:txBody>
+          <a:bodyPr/>
+          <a:lstStyle/>
+          <a:p>
+            <a:endParaRPr lang="bg-BG"/>
+          </a:p>
+        </p:txBody>
       </p:sp>
       <p:sp>
         <p:nvSpPr>
@@ -5398,6 +5466,13 @@
             </a:stretch>
           </a:blipFill>
         </p:spPr>
+        <p:txBody>
+          <a:bodyPr/>
+          <a:lstStyle/>
+          <a:p>
+            <a:endParaRPr lang="bg-BG"/>
+          </a:p>
+        </p:txBody>
       </p:sp>
       <p:sp>
         <p:nvSpPr>
@@ -5945,6 +6020,13 @@
             </a:stretch>
           </a:blipFill>
         </p:spPr>
+        <p:txBody>
+          <a:bodyPr/>
+          <a:lstStyle/>
+          <a:p>
+            <a:endParaRPr lang="bg-BG"/>
+          </a:p>
+        </p:txBody>
       </p:sp>
       <p:sp>
         <p:nvSpPr>
@@ -6492,6 +6574,13 @@
             </a:stretch>
           </a:blipFill>
         </p:spPr>
+        <p:txBody>
+          <a:bodyPr/>
+          <a:lstStyle/>
+          <a:p>
+            <a:endParaRPr lang="bg-BG"/>
+          </a:p>
+        </p:txBody>
       </p:sp>
       <p:sp>
         <p:nvSpPr>
@@ -7039,6 +7128,13 @@
             </a:stretch>
           </a:blipFill>
         </p:spPr>
+        <p:txBody>
+          <a:bodyPr/>
+          <a:lstStyle/>
+          <a:p>
+            <a:endParaRPr lang="bg-BG"/>
+          </a:p>
+        </p:txBody>
       </p:sp>
       <p:sp>
         <p:nvSpPr>
@@ -7048,7 +7144,7 @@
         </p:nvSpPr>
         <p:spPr>
           <a:xfrm>
-            <a:off x="3581400" y="5001202"/>
+            <a:off x="2823753" y="5024788"/>
             <a:ext cx="12640494" cy="1615827"/>
           </a:xfrm>
           <a:prstGeom prst="rect">
@@ -7132,6 +7228,13 @@
             </a:stretch>
           </a:blipFill>
         </p:spPr>
+        <p:txBody>
+          <a:bodyPr/>
+          <a:lstStyle/>
+          <a:p>
+            <a:endParaRPr lang="bg-BG"/>
+          </a:p>
+        </p:txBody>
       </p:sp>
     </p:spTree>
   </p:cSld>
@@ -7306,6 +7409,13 @@
               <a:miter/>
             </a:ln>
           </p:spPr>
+          <p:txBody>
+            <a:bodyPr/>
+            <a:lstStyle/>
+            <a:p>
+              <a:endParaRPr lang="bg-BG"/>
+            </a:p>
+          </p:txBody>
         </p:sp>
         <p:sp>
           <p:nvSpPr>
@@ -7450,6 +7560,13 @@
               <a:miter/>
             </a:ln>
           </p:spPr>
+          <p:txBody>
+            <a:bodyPr/>
+            <a:lstStyle/>
+            <a:p>
+              <a:endParaRPr lang="bg-BG"/>
+            </a:p>
+          </p:txBody>
         </p:sp>
         <p:sp>
           <p:nvSpPr>
@@ -7531,6 +7648,13 @@
             </a:stretch>
           </a:blipFill>
         </p:spPr>
+        <p:txBody>
+          <a:bodyPr/>
+          <a:lstStyle/>
+          <a:p>
+            <a:endParaRPr lang="bg-BG"/>
+          </a:p>
+        </p:txBody>
       </p:sp>
     </p:spTree>
   </p:cSld>
@@ -7628,6 +7752,13 @@
             </a:stretch>
           </a:blipFill>
         </p:spPr>
+        <p:txBody>
+          <a:bodyPr/>
+          <a:lstStyle/>
+          <a:p>
+            <a:endParaRPr lang="bg-BG"/>
+          </a:p>
+        </p:txBody>
       </p:sp>
       <p:grpSp>
         <p:nvGrpSpPr>
@@ -7698,6 +7829,13 @@
               <a:miter/>
             </a:ln>
           </p:spPr>
+          <p:txBody>
+            <a:bodyPr/>
+            <a:lstStyle/>
+            <a:p>
+              <a:endParaRPr lang="bg-BG"/>
+            </a:p>
+          </p:txBody>
         </p:sp>
         <p:sp>
           <p:nvSpPr>
@@ -7780,7 +7918,7 @@
         </p:nvSpPr>
         <p:spPr>
           <a:xfrm>
-            <a:off x="1197250" y="1377999"/>
+            <a:off x="722767" y="795187"/>
             <a:ext cx="5862054" cy="1473609"/>
           </a:xfrm>
           <a:prstGeom prst="rect">
@@ -7886,6 +8024,13 @@
               <a:miter/>
             </a:ln>
           </p:spPr>
+          <p:txBody>
+            <a:bodyPr/>
+            <a:lstStyle/>
+            <a:p>
+              <a:endParaRPr lang="bg-BG"/>
+            </a:p>
+          </p:txBody>
         </p:sp>
         <p:sp>
           <p:nvSpPr>
@@ -7967,6 +8112,13 @@
             </a:stretch>
           </a:blipFill>
         </p:spPr>
+        <p:txBody>
+          <a:bodyPr/>
+          <a:lstStyle/>
+          <a:p>
+            <a:endParaRPr lang="bg-BG"/>
+          </a:p>
+        </p:txBody>
       </p:sp>
     </p:spTree>
     <p:extLst>
@@ -8069,6 +8221,13 @@
             </a:stretch>
           </a:blipFill>
         </p:spPr>
+        <p:txBody>
+          <a:bodyPr/>
+          <a:lstStyle/>
+          <a:p>
+            <a:endParaRPr lang="bg-BG"/>
+          </a:p>
+        </p:txBody>
       </p:sp>
       <p:sp>
         <p:nvSpPr>
@@ -8183,6 +8342,13 @@
               <a:miter/>
             </a:ln>
           </p:spPr>
+          <p:txBody>
+            <a:bodyPr/>
+            <a:lstStyle/>
+            <a:p>
+              <a:endParaRPr lang="bg-BG"/>
+            </a:p>
+          </p:txBody>
         </p:sp>
         <p:sp>
           <p:nvSpPr>
@@ -8265,7 +8431,7 @@
         </p:nvSpPr>
         <p:spPr>
           <a:xfrm>
-            <a:off x="1197250" y="1377999"/>
+            <a:off x="722767" y="802511"/>
             <a:ext cx="5862054" cy="1473609"/>
           </a:xfrm>
           <a:prstGeom prst="rect">
@@ -8371,6 +8537,13 @@
               <a:miter/>
             </a:ln>
           </p:spPr>
+          <p:txBody>
+            <a:bodyPr/>
+            <a:lstStyle/>
+            <a:p>
+              <a:endParaRPr lang="bg-BG"/>
+            </a:p>
+          </p:txBody>
         </p:sp>
         <p:sp>
           <p:nvSpPr>
@@ -8452,6 +8625,13 @@
             </a:stretch>
           </a:blipFill>
         </p:spPr>
+        <p:txBody>
+          <a:bodyPr/>
+          <a:lstStyle/>
+          <a:p>
+            <a:endParaRPr lang="bg-BG"/>
+          </a:p>
+        </p:txBody>
       </p:sp>
     </p:spTree>
     <p:extLst>
@@ -8554,6 +8734,13 @@
             </a:stretch>
           </a:blipFill>
         </p:spPr>
+        <p:txBody>
+          <a:bodyPr/>
+          <a:lstStyle/>
+          <a:p>
+            <a:endParaRPr lang="bg-BG"/>
+          </a:p>
+        </p:txBody>
       </p:sp>
       <p:sp>
         <p:nvSpPr>
@@ -8668,6 +8855,13 @@
               <a:miter/>
             </a:ln>
           </p:spPr>
+          <p:txBody>
+            <a:bodyPr/>
+            <a:lstStyle/>
+            <a:p>
+              <a:endParaRPr lang="bg-BG"/>
+            </a:p>
+          </p:txBody>
         </p:sp>
         <p:sp>
           <p:nvSpPr>
@@ -8815,7 +9009,7 @@
         </p:nvSpPr>
         <p:spPr>
           <a:xfrm>
-            <a:off x="1197250" y="1377999"/>
+            <a:off x="738318" y="802511"/>
             <a:ext cx="5862054" cy="1473609"/>
           </a:xfrm>
           <a:prstGeom prst="rect">
@@ -8921,6 +9115,13 @@
               <a:miter/>
             </a:ln>
           </p:spPr>
+          <p:txBody>
+            <a:bodyPr/>
+            <a:lstStyle/>
+            <a:p>
+              <a:endParaRPr lang="bg-BG"/>
+            </a:p>
+          </p:txBody>
         </p:sp>
         <p:sp>
           <p:nvSpPr>
@@ -9002,6 +9203,13 @@
             </a:stretch>
           </a:blipFill>
         </p:spPr>
+        <p:txBody>
+          <a:bodyPr/>
+          <a:lstStyle/>
+          <a:p>
+            <a:endParaRPr lang="bg-BG"/>
+          </a:p>
+        </p:txBody>
       </p:sp>
     </p:spTree>
     <p:extLst>

</xml_diff>